<commit_message>
fnirs analyses + citenet update + add juspace maps
</commit_message>
<xml_diff>
--- a/fig/fig2.pptx
+++ b/fig/fig2.pptx
@@ -300,7 +300,7 @@
               <a:pPr>
                 <a:defRPr/>
               </a:pPr>
-              <a:t>28.04.22</a:t>
+              <a:t>27.06.22</a:t>
             </a:fld>
             <a:endParaRPr lang="en-DE"/>
           </a:p>
@@ -515,7 +515,7 @@
               <a:pPr>
                 <a:defRPr/>
               </a:pPr>
-              <a:t>28.04.22</a:t>
+              <a:t>27.06.22</a:t>
             </a:fld>
             <a:endParaRPr lang="en-DE"/>
           </a:p>
@@ -740,7 +740,7 @@
               <a:pPr>
                 <a:defRPr/>
               </a:pPr>
-              <a:t>28.04.22</a:t>
+              <a:t>27.06.22</a:t>
             </a:fld>
             <a:endParaRPr lang="en-DE"/>
           </a:p>
@@ -955,7 +955,7 @@
               <a:pPr>
                 <a:defRPr/>
               </a:pPr>
-              <a:t>28.04.22</a:t>
+              <a:t>27.06.22</a:t>
             </a:fld>
             <a:endParaRPr lang="en-DE"/>
           </a:p>
@@ -1244,7 +1244,7 @@
               <a:pPr>
                 <a:defRPr/>
               </a:pPr>
-              <a:t>28.04.22</a:t>
+              <a:t>27.06.22</a:t>
             </a:fld>
             <a:endParaRPr lang="en-DE"/>
           </a:p>
@@ -1521,7 +1521,7 @@
               <a:pPr>
                 <a:defRPr/>
               </a:pPr>
-              <a:t>28.04.22</a:t>
+              <a:t>27.06.22</a:t>
             </a:fld>
             <a:endParaRPr lang="en-DE"/>
           </a:p>
@@ -1933,7 +1933,7 @@
               <a:pPr>
                 <a:defRPr/>
               </a:pPr>
-              <a:t>28.04.22</a:t>
+              <a:t>27.06.22</a:t>
             </a:fld>
             <a:endParaRPr lang="en-DE"/>
           </a:p>
@@ -2096,7 +2096,7 @@
               <a:pPr>
                 <a:defRPr/>
               </a:pPr>
-              <a:t>28.04.22</a:t>
+              <a:t>27.06.22</a:t>
             </a:fld>
             <a:endParaRPr lang="en-DE"/>
           </a:p>
@@ -2236,7 +2236,7 @@
               <a:pPr>
                 <a:defRPr/>
               </a:pPr>
-              <a:t>28.04.22</a:t>
+              <a:t>27.06.22</a:t>
             </a:fld>
             <a:endParaRPr lang="en-DE"/>
           </a:p>
@@ -2558,7 +2558,7 @@
               <a:pPr>
                 <a:defRPr/>
               </a:pPr>
-              <a:t>28.04.22</a:t>
+              <a:t>27.06.22</a:t>
             </a:fld>
             <a:endParaRPr lang="en-DE"/>
           </a:p>
@@ -2863,7 +2863,7 @@
               <a:pPr>
                 <a:defRPr/>
               </a:pPr>
-              <a:t>28.04.22</a:t>
+              <a:t>27.06.22</a:t>
             </a:fld>
             <a:endParaRPr lang="en-DE"/>
           </a:p>
@@ -3190,7 +3190,7 @@
               <a:pPr>
                 <a:defRPr/>
               </a:pPr>
-              <a:t>28.04.22</a:t>
+              <a:t>27.06.22</a:t>
             </a:fld>
             <a:endParaRPr lang="en-DE"/>
           </a:p>
@@ -3799,8 +3799,8 @@
         </p:blipFill>
         <p:spPr bwMode="auto">
           <a:xfrm>
-            <a:off x="8526647" y="294989"/>
-            <a:ext cx="7688774" cy="2203788"/>
+            <a:off x="8526648" y="294989"/>
+            <a:ext cx="7688771" cy="2203788"/>
           </a:xfrm>
           <a:prstGeom prst="rect">
             <a:avLst/>
@@ -4980,8 +4980,8 @@
         </p:blipFill>
         <p:spPr>
           <a:xfrm>
-            <a:off x="8443084" y="2455591"/>
-            <a:ext cx="7535999" cy="2123999"/>
+            <a:off x="8443085" y="2455591"/>
+            <a:ext cx="7535996" cy="2123999"/>
           </a:xfrm>
           <a:prstGeom prst="rect">
             <a:avLst/>

</xml_diff>

<commit_message>
add RSN permutation test, add cluster mass threshold
</commit_message>
<xml_diff>
--- a/fig/fig2.pptx
+++ b/fig/fig2.pptx
@@ -300,7 +300,7 @@
               <a:pPr>
                 <a:defRPr/>
               </a:pPr>
-              <a:t>27.06.22</a:t>
+              <a:t>12.07.22</a:t>
             </a:fld>
             <a:endParaRPr lang="en-DE"/>
           </a:p>
@@ -515,7 +515,7 @@
               <a:pPr>
                 <a:defRPr/>
               </a:pPr>
-              <a:t>27.06.22</a:t>
+              <a:t>12.07.22</a:t>
             </a:fld>
             <a:endParaRPr lang="en-DE"/>
           </a:p>
@@ -740,7 +740,7 @@
               <a:pPr>
                 <a:defRPr/>
               </a:pPr>
-              <a:t>27.06.22</a:t>
+              <a:t>12.07.22</a:t>
             </a:fld>
             <a:endParaRPr lang="en-DE"/>
           </a:p>
@@ -955,7 +955,7 @@
               <a:pPr>
                 <a:defRPr/>
               </a:pPr>
-              <a:t>27.06.22</a:t>
+              <a:t>12.07.22</a:t>
             </a:fld>
             <a:endParaRPr lang="en-DE"/>
           </a:p>
@@ -1244,7 +1244,7 @@
               <a:pPr>
                 <a:defRPr/>
               </a:pPr>
-              <a:t>27.06.22</a:t>
+              <a:t>12.07.22</a:t>
             </a:fld>
             <a:endParaRPr lang="en-DE"/>
           </a:p>
@@ -1521,7 +1521,7 @@
               <a:pPr>
                 <a:defRPr/>
               </a:pPr>
-              <a:t>27.06.22</a:t>
+              <a:t>12.07.22</a:t>
             </a:fld>
             <a:endParaRPr lang="en-DE"/>
           </a:p>
@@ -1933,7 +1933,7 @@
               <a:pPr>
                 <a:defRPr/>
               </a:pPr>
-              <a:t>27.06.22</a:t>
+              <a:t>12.07.22</a:t>
             </a:fld>
             <a:endParaRPr lang="en-DE"/>
           </a:p>
@@ -2096,7 +2096,7 @@
               <a:pPr>
                 <a:defRPr/>
               </a:pPr>
-              <a:t>27.06.22</a:t>
+              <a:t>12.07.22</a:t>
             </a:fld>
             <a:endParaRPr lang="en-DE"/>
           </a:p>
@@ -2236,7 +2236,7 @@
               <a:pPr>
                 <a:defRPr/>
               </a:pPr>
-              <a:t>27.06.22</a:t>
+              <a:t>12.07.22</a:t>
             </a:fld>
             <a:endParaRPr lang="en-DE"/>
           </a:p>
@@ -2558,7 +2558,7 @@
               <a:pPr>
                 <a:defRPr/>
               </a:pPr>
-              <a:t>27.06.22</a:t>
+              <a:t>12.07.22</a:t>
             </a:fld>
             <a:endParaRPr lang="en-DE"/>
           </a:p>
@@ -2863,7 +2863,7 @@
               <a:pPr>
                 <a:defRPr/>
               </a:pPr>
-              <a:t>27.06.22</a:t>
+              <a:t>12.07.22</a:t>
             </a:fld>
             <a:endParaRPr lang="en-DE"/>
           </a:p>
@@ -3190,7 +3190,7 @@
               <a:pPr>
                 <a:defRPr/>
               </a:pPr>
-              <a:t>27.06.22</a:t>
+              <a:t>12.07.22</a:t>
             </a:fld>
             <a:endParaRPr lang="en-DE"/>
           </a:p>
@@ -4703,8 +4703,8 @@
         </p:blipFill>
         <p:spPr>
           <a:xfrm>
-            <a:off x="8285485" y="4641737"/>
-            <a:ext cx="7820149" cy="2932556"/>
+            <a:off x="8308345" y="4630389"/>
+            <a:ext cx="7892993" cy="3011126"/>
           </a:xfrm>
           <a:prstGeom prst="rect">
             <a:avLst/>

</xml_diff>

<commit_message>
Update spatial correlations to JuSpyce
</commit_message>
<xml_diff>
--- a/fig/fig2.pptx
+++ b/fig/fig2.pptx
@@ -300,7 +300,7 @@
               <a:pPr>
                 <a:defRPr/>
               </a:pPr>
-              <a:t>12.07.22</a:t>
+              <a:t>13.07.22</a:t>
             </a:fld>
             <a:endParaRPr lang="en-DE"/>
           </a:p>
@@ -515,7 +515,7 @@
               <a:pPr>
                 <a:defRPr/>
               </a:pPr>
-              <a:t>12.07.22</a:t>
+              <a:t>13.07.22</a:t>
             </a:fld>
             <a:endParaRPr lang="en-DE"/>
           </a:p>
@@ -740,7 +740,7 @@
               <a:pPr>
                 <a:defRPr/>
               </a:pPr>
-              <a:t>12.07.22</a:t>
+              <a:t>13.07.22</a:t>
             </a:fld>
             <a:endParaRPr lang="en-DE"/>
           </a:p>
@@ -955,7 +955,7 @@
               <a:pPr>
                 <a:defRPr/>
               </a:pPr>
-              <a:t>12.07.22</a:t>
+              <a:t>13.07.22</a:t>
             </a:fld>
             <a:endParaRPr lang="en-DE"/>
           </a:p>
@@ -1244,7 +1244,7 @@
               <a:pPr>
                 <a:defRPr/>
               </a:pPr>
-              <a:t>12.07.22</a:t>
+              <a:t>13.07.22</a:t>
             </a:fld>
             <a:endParaRPr lang="en-DE"/>
           </a:p>
@@ -1521,7 +1521,7 @@
               <a:pPr>
                 <a:defRPr/>
               </a:pPr>
-              <a:t>12.07.22</a:t>
+              <a:t>13.07.22</a:t>
             </a:fld>
             <a:endParaRPr lang="en-DE"/>
           </a:p>
@@ -1933,7 +1933,7 @@
               <a:pPr>
                 <a:defRPr/>
               </a:pPr>
-              <a:t>12.07.22</a:t>
+              <a:t>13.07.22</a:t>
             </a:fld>
             <a:endParaRPr lang="en-DE"/>
           </a:p>
@@ -2096,7 +2096,7 @@
               <a:pPr>
                 <a:defRPr/>
               </a:pPr>
-              <a:t>12.07.22</a:t>
+              <a:t>13.07.22</a:t>
             </a:fld>
             <a:endParaRPr lang="en-DE"/>
           </a:p>
@@ -2236,7 +2236,7 @@
               <a:pPr>
                 <a:defRPr/>
               </a:pPr>
-              <a:t>12.07.22</a:t>
+              <a:t>13.07.22</a:t>
             </a:fld>
             <a:endParaRPr lang="en-DE"/>
           </a:p>
@@ -2558,7 +2558,7 @@
               <a:pPr>
                 <a:defRPr/>
               </a:pPr>
-              <a:t>12.07.22</a:t>
+              <a:t>13.07.22</a:t>
             </a:fld>
             <a:endParaRPr lang="en-DE"/>
           </a:p>
@@ -2863,7 +2863,7 @@
               <a:pPr>
                 <a:defRPr/>
               </a:pPr>
-              <a:t>12.07.22</a:t>
+              <a:t>13.07.22</a:t>
             </a:fld>
             <a:endParaRPr lang="en-DE"/>
           </a:p>
@@ -3190,7 +3190,7 @@
               <a:pPr>
                 <a:defRPr/>
               </a:pPr>
-              <a:t>12.07.22</a:t>
+              <a:t>13.07.22</a:t>
             </a:fld>
             <a:endParaRPr lang="en-DE"/>
           </a:p>
@@ -4951,8 +4951,8 @@
         </p:blipFill>
         <p:spPr>
           <a:xfrm>
-            <a:off x="8406930" y="7845494"/>
-            <a:ext cx="7692810" cy="4254682"/>
+            <a:off x="8406931" y="7845494"/>
+            <a:ext cx="7692808" cy="4254682"/>
           </a:xfrm>
           <a:prstGeom prst="rect">
             <a:avLst/>

</xml_diff>